<commit_message>
re-order lessons and update with new book
</commit_message>
<xml_diff>
--- a/infrastructure-week-1.pptx
+++ b/infrastructure-week-1.pptx
@@ -220,7 +220,7 @@
           <a:p>
             <a:fld id="{641D1767-5D2B-3D44-AD25-F20FD82358ED}" type="datetimeFigureOut">
               <a:rPr lang="en-US" smtClean="0"/>
-              <a:t>8/6/16</a:t>
+              <a:t>8/13/16</a:t>
             </a:fld>
             <a:endParaRPr lang="en-US"/>
           </a:p>
@@ -753,7 +753,7 @@
           <a:p>
             <a:fld id="{CF3BFC7F-127C-9A47-BA20-D8F69BD63ABE}" type="datetimeFigureOut">
               <a:rPr lang="en-US" smtClean="0"/>
-              <a:t>8/6/16</a:t>
+              <a:t>8/13/16</a:t>
             </a:fld>
             <a:endParaRPr lang="en-US"/>
           </a:p>
@@ -923,7 +923,7 @@
           <a:p>
             <a:fld id="{CF3BFC7F-127C-9A47-BA20-D8F69BD63ABE}" type="datetimeFigureOut">
               <a:rPr lang="en-US" smtClean="0"/>
-              <a:t>8/6/16</a:t>
+              <a:t>8/13/16</a:t>
             </a:fld>
             <a:endParaRPr lang="en-US"/>
           </a:p>
@@ -1103,7 +1103,7 @@
           <a:p>
             <a:fld id="{CF3BFC7F-127C-9A47-BA20-D8F69BD63ABE}" type="datetimeFigureOut">
               <a:rPr lang="en-US" smtClean="0"/>
-              <a:t>8/6/16</a:t>
+              <a:t>8/13/16</a:t>
             </a:fld>
             <a:endParaRPr lang="en-US"/>
           </a:p>
@@ -1273,7 +1273,7 @@
           <a:p>
             <a:fld id="{CF3BFC7F-127C-9A47-BA20-D8F69BD63ABE}" type="datetimeFigureOut">
               <a:rPr lang="en-US" smtClean="0"/>
-              <a:t>8/6/16</a:t>
+              <a:t>8/13/16</a:t>
             </a:fld>
             <a:endParaRPr lang="en-US"/>
           </a:p>
@@ -1519,7 +1519,7 @@
           <a:p>
             <a:fld id="{CF3BFC7F-127C-9A47-BA20-D8F69BD63ABE}" type="datetimeFigureOut">
               <a:rPr lang="en-US" smtClean="0"/>
-              <a:t>8/6/16</a:t>
+              <a:t>8/13/16</a:t>
             </a:fld>
             <a:endParaRPr lang="en-US"/>
           </a:p>
@@ -1807,7 +1807,7 @@
           <a:p>
             <a:fld id="{CF3BFC7F-127C-9A47-BA20-D8F69BD63ABE}" type="datetimeFigureOut">
               <a:rPr lang="en-US" smtClean="0"/>
-              <a:t>8/6/16</a:t>
+              <a:t>8/13/16</a:t>
             </a:fld>
             <a:endParaRPr lang="en-US"/>
           </a:p>
@@ -2229,7 +2229,7 @@
           <a:p>
             <a:fld id="{CF3BFC7F-127C-9A47-BA20-D8F69BD63ABE}" type="datetimeFigureOut">
               <a:rPr lang="en-US" smtClean="0"/>
-              <a:t>8/6/16</a:t>
+              <a:t>8/13/16</a:t>
             </a:fld>
             <a:endParaRPr lang="en-US"/>
           </a:p>
@@ -2347,7 +2347,7 @@
           <a:p>
             <a:fld id="{CF3BFC7F-127C-9A47-BA20-D8F69BD63ABE}" type="datetimeFigureOut">
               <a:rPr lang="en-US" smtClean="0"/>
-              <a:t>8/6/16</a:t>
+              <a:t>8/13/16</a:t>
             </a:fld>
             <a:endParaRPr lang="en-US"/>
           </a:p>
@@ -2442,7 +2442,7 @@
           <a:p>
             <a:fld id="{CF3BFC7F-127C-9A47-BA20-D8F69BD63ABE}" type="datetimeFigureOut">
               <a:rPr lang="en-US" smtClean="0"/>
-              <a:t>8/6/16</a:t>
+              <a:t>8/13/16</a:t>
             </a:fld>
             <a:endParaRPr lang="en-US"/>
           </a:p>
@@ -2719,7 +2719,7 @@
           <a:p>
             <a:fld id="{CF3BFC7F-127C-9A47-BA20-D8F69BD63ABE}" type="datetimeFigureOut">
               <a:rPr lang="en-US" smtClean="0"/>
-              <a:t>8/6/16</a:t>
+              <a:t>8/13/16</a:t>
             </a:fld>
             <a:endParaRPr lang="en-US"/>
           </a:p>
@@ -2972,7 +2972,7 @@
           <a:p>
             <a:fld id="{CF3BFC7F-127C-9A47-BA20-D8F69BD63ABE}" type="datetimeFigureOut">
               <a:rPr lang="en-US" smtClean="0"/>
-              <a:t>8/6/16</a:t>
+              <a:t>8/13/16</a:t>
             </a:fld>
             <a:endParaRPr lang="en-US"/>
           </a:p>
@@ -3185,7 +3185,7 @@
           <a:p>
             <a:fld id="{CF3BFC7F-127C-9A47-BA20-D8F69BD63ABE}" type="datetimeFigureOut">
               <a:rPr lang="en-US" smtClean="0"/>
-              <a:t>8/6/16</a:t>
+              <a:t>8/13/16</a:t>
             </a:fld>
             <a:endParaRPr lang="en-US"/>
           </a:p>
@@ -5138,15 +5138,7 @@
           <a:p>
             <a:r>
               <a:rPr lang="en-US" dirty="0" smtClean="0"/>
-              <a:t>This is a new course and we are all beta testers. I appreciate your </a:t>
-            </a:r>
-            <a:r>
-              <a:rPr lang="en-US" dirty="0" smtClean="0"/>
-              <a:t>feedback</a:t>
-            </a:r>
-            <a:r>
-              <a:rPr lang="en-US" dirty="0" smtClean="0"/>
-              <a:t>. </a:t>
+              <a:t>This is a new course and we are all beta testers. I appreciate your feedback. </a:t>
             </a:r>
           </a:p>
           <a:p>
@@ -5474,7 +5466,6 @@
               <a:rPr lang="en-US" sz="2000" dirty="0" smtClean="0"/>
               <a:t>, Microsoft TFS</a:t>
             </a:r>
-            <a:endParaRPr lang="en-US" sz="2000" dirty="0" smtClean="0"/>
           </a:p>
           <a:p>
             <a:pPr lvl="1"/>
@@ -7229,25 +7220,11 @@
               <a:t>Read </a:t>
             </a:r>
             <a:r>
-              <a:rPr lang="en-US" dirty="0"/>
-              <a:t>Web Operations Chapter </a:t>
-            </a:r>
-            <a:r>
-              <a:rPr lang="en-US" dirty="0" smtClean="0"/>
-              <a:t>1</a:t>
-            </a:r>
-          </a:p>
-          <a:p>
-            <a:r>
-              <a:rPr lang="en-US" dirty="0" smtClean="0"/>
-              <a:t>Read </a:t>
-            </a:r>
-            <a:r>
-              <a:rPr lang="en-US" dirty="0"/>
+              <a:rPr lang="en-US" i="1" dirty="0"/>
               <a:t>Practice of Cloud </a:t>
             </a:r>
             <a:r>
-              <a:rPr lang="en-US" dirty="0" smtClean="0"/>
+              <a:rPr lang="en-US" i="1" dirty="0" smtClean="0"/>
               <a:t>Systems Administration </a:t>
             </a:r>
             <a:r>
@@ -7265,22 +7242,22 @@
               <a:t>Read </a:t>
             </a:r>
             <a:r>
-              <a:rPr lang="en-US" dirty="0" err="1" smtClean="0"/>
+              <a:rPr lang="en-US" i="1" dirty="0" err="1" smtClean="0"/>
               <a:t>Git</a:t>
             </a:r>
             <a:r>
-              <a:rPr lang="en-US" dirty="0" smtClean="0"/>
+              <a:rPr lang="en-US" i="1" dirty="0" smtClean="0"/>
               <a:t> Hands On Guide</a:t>
             </a:r>
           </a:p>
           <a:p>
             <a:r>
-              <a:rPr lang="en-US" smtClean="0"/>
-              <a:t>Start reading Linux </a:t>
-            </a:r>
-            <a:r>
-              <a:rPr lang="en-US" dirty="0" smtClean="0"/>
-              <a:t>Hands On Guide</a:t>
+              <a:rPr lang="en-US" dirty="0" smtClean="0"/>
+              <a:t>Start reading </a:t>
+            </a:r>
+            <a:r>
+              <a:rPr lang="en-US" i="1" dirty="0" smtClean="0"/>
+              <a:t>Linux Hands On Guide</a:t>
             </a:r>
           </a:p>
           <a:p>
@@ -7387,15 +7364,7 @@
           <a:p>
             <a:r>
               <a:rPr lang="en-US" sz="2800" dirty="0" smtClean="0"/>
-              <a:t>Hobbies include underwater photography, cycling, and </a:t>
-            </a:r>
-            <a:r>
-              <a:rPr lang="en-US" sz="2800" dirty="0" smtClean="0"/>
-              <a:t>analog </a:t>
-            </a:r>
-            <a:r>
-              <a:rPr lang="en-US" sz="2800" dirty="0" smtClean="0"/>
-              <a:t>music synthesizers</a:t>
+              <a:t>Hobbies include underwater photography, cycling, and analog music synthesizers</a:t>
             </a:r>
             <a:endParaRPr lang="en-US" sz="2800" dirty="0"/>
           </a:p>

</xml_diff>